<commit_message>
Swift day 12: FileManager, FileHandle
</commit_message>
<xml_diff>
--- a/Swift_Day12/Swift_Day12.pptx
+++ b/Swift_Day12/Swift_Day12.pptx
@@ -5,7 +5,7 @@
     <p:sldMasterId id="2147484307" r:id="rId1"/>
   </p:sldMasterIdLst>
   <p:notesMasterIdLst>
-    <p:notesMasterId r:id="rId7"/>
+    <p:notesMasterId r:id="rId9"/>
   </p:notesMasterIdLst>
   <p:sldIdLst>
     <p:sldId id="256" r:id="rId2"/>
@@ -13,6 +13,8 @@
     <p:sldId id="307" r:id="rId4"/>
     <p:sldId id="308" r:id="rId5"/>
     <p:sldId id="309" r:id="rId6"/>
+    <p:sldId id="310" r:id="rId7"/>
+    <p:sldId id="311" r:id="rId8"/>
   </p:sldIdLst>
   <p:sldSz cx="12192000" cy="6858000"/>
   <p:notesSz cx="6858000" cy="9144000"/>
@@ -212,7 +214,7 @@
           <a:p>
             <a:fld id="{A2532484-9BFA-1A4F-972E-7C725892EC3F}" type="datetimeFigureOut">
               <a:rPr lang="en-US" smtClean="0"/>
-              <a:t>10/5/15</a:t>
+              <a:t>10/28/15</a:t>
             </a:fld>
             <a:endParaRPr lang="en-US"/>
           </a:p>
@@ -524,14 +526,6 @@
           <a:bodyPr/>
           <a:lstStyle/>
           <a:p>
-            <a:r>
-              <a:rPr lang="vi-VN" dirty="0" smtClean="0"/>
-              <a:t>Quy tắc sử dụng ngôn ngữ,</a:t>
-            </a:r>
-            <a:r>
-              <a:rPr lang="vi-VN" baseline="0" dirty="0" smtClean="0"/>
-              <a:t> cú pháp trong swift</a:t>
-            </a:r>
             <a:endParaRPr lang="en-US" dirty="0"/>
           </a:p>
         </p:txBody>
@@ -1423,7 +1417,7 @@
               <a:t>NSSearchPathDomainMask</a:t>
             </a:r>
             <a:r>
-              <a:rPr lang="en-US" sz="1200" kern="1200" smtClean="0">
+              <a:rPr lang="en-US" sz="1200" kern="1200" dirty="0" smtClean="0">
                 <a:solidFill>
                   <a:schemeClr val="tx1"/>
                 </a:solidFill>
@@ -1434,9 +1428,36 @@
               </a:rPr>
               <a:t> enumeration. </a:t>
             </a:r>
-            <a:endParaRPr lang="en-US" smtClean="0"/>
-          </a:p>
-          <a:p>
+            <a:endParaRPr lang="en-US" dirty="0" smtClean="0"/>
+          </a:p>
+          <a:p>
+            <a:r>
+              <a:rPr lang="en-US" dirty="0" smtClean="0"/>
+              <a:t>Ref:</a:t>
+            </a:r>
+            <a:br>
+              <a:rPr lang="en-US" dirty="0" smtClean="0"/>
+            </a:br>
+            <a:r>
+              <a:rPr lang="en-US" dirty="0" smtClean="0"/>
+              <a:t>http://</a:t>
+            </a:r>
+            <a:r>
+              <a:rPr lang="en-US" dirty="0" err="1" smtClean="0"/>
+              <a:t>www.techotopia.com</a:t>
+            </a:r>
+            <a:r>
+              <a:rPr lang="en-US" dirty="0" smtClean="0"/>
+              <a:t>/</a:t>
+            </a:r>
+            <a:r>
+              <a:rPr lang="en-US" dirty="0" err="1" smtClean="0"/>
+              <a:t>index.php</a:t>
+            </a:r>
+            <a:r>
+              <a:rPr lang="en-US" dirty="0" smtClean="0"/>
+              <a:t>/Working_with_Files_in_Swift_on_iOS_8</a:t>
+            </a:r>
             <a:endParaRPr lang="en-US" dirty="0"/>
           </a:p>
         </p:txBody>
@@ -1468,6 +1489,563 @@
     <p:extLst>
       <p:ext uri="{BB962C8B-B14F-4D97-AF65-F5344CB8AC3E}">
         <p14:creationId xmlns:p14="http://schemas.microsoft.com/office/powerpoint/2010/main" val="1398401603"/>
+      </p:ext>
+    </p:extLst>
+  </p:cSld>
+  <p:clrMapOvr>
+    <a:masterClrMapping/>
+  </p:clrMapOvr>
+</p:notes>
+</file>
+
+<file path=ppt/notesSlides/notesSlide5.xml><?xml version="1.0" encoding="utf-8"?>
+<p:notes xmlns:a="http://schemas.openxmlformats.org/drawingml/2006/main" xmlns:r="http://schemas.openxmlformats.org/officeDocument/2006/relationships" xmlns:p="http://schemas.openxmlformats.org/presentationml/2006/main">
+  <p:cSld>
+    <p:spTree>
+      <p:nvGrpSpPr>
+        <p:cNvPr id="1" name=""/>
+        <p:cNvGrpSpPr/>
+        <p:nvPr/>
+      </p:nvGrpSpPr>
+      <p:grpSpPr>
+        <a:xfrm>
+          <a:off x="0" y="0"/>
+          <a:ext cx="0" cy="0"/>
+          <a:chOff x="0" y="0"/>
+          <a:chExt cx="0" cy="0"/>
+        </a:xfrm>
+      </p:grpSpPr>
+      <p:sp>
+        <p:nvSpPr>
+          <p:cNvPr id="2" name="Slide Image Placeholder 1"/>
+          <p:cNvSpPr>
+            <a:spLocks noGrp="1" noRot="1" noChangeAspect="1"/>
+          </p:cNvSpPr>
+          <p:nvPr>
+            <p:ph type="sldImg"/>
+          </p:nvPr>
+        </p:nvSpPr>
+        <p:spPr/>
+      </p:sp>
+      <p:sp>
+        <p:nvSpPr>
+          <p:cNvPr id="3" name="Notes Placeholder 2"/>
+          <p:cNvSpPr>
+            <a:spLocks noGrp="1"/>
+          </p:cNvSpPr>
+          <p:nvPr>
+            <p:ph type="body" idx="1"/>
+          </p:nvPr>
+        </p:nvSpPr>
+        <p:spPr/>
+        <p:txBody>
+          <a:bodyPr/>
+          <a:lstStyle/>
+          <a:p>
+            <a:r>
+              <a:rPr lang="en-US" sz="1200" kern="1200" dirty="0" smtClean="0">
+                <a:solidFill>
+                  <a:schemeClr val="tx1"/>
+                </a:solidFill>
+                <a:effectLst/>
+                <a:latin typeface="+mn-lt"/>
+                <a:ea typeface="+mn-ea"/>
+                <a:cs typeface="+mn-cs"/>
+              </a:rPr>
+              <a:t>The </a:t>
+            </a:r>
+            <a:r>
+              <a:rPr lang="en-US" sz="1200" kern="1200" dirty="0" err="1" smtClean="0">
+                <a:solidFill>
+                  <a:schemeClr val="tx1"/>
+                </a:solidFill>
+                <a:effectLst/>
+                <a:latin typeface="+mn-lt"/>
+                <a:ea typeface="+mn-ea"/>
+                <a:cs typeface="+mn-cs"/>
+              </a:rPr>
+              <a:t>URLsForDirectory:inDomains</a:t>
+            </a:r>
+            <a:r>
+              <a:rPr lang="en-US" sz="1200" kern="1200" dirty="0" smtClean="0">
+                <a:solidFill>
+                  <a:schemeClr val="tx1"/>
+                </a:solidFill>
+                <a:effectLst/>
+                <a:latin typeface="+mn-lt"/>
+                <a:ea typeface="+mn-ea"/>
+                <a:cs typeface="+mn-cs"/>
+              </a:rPr>
+              <a:t>: instance method of the </a:t>
+            </a:r>
+            <a:r>
+              <a:rPr lang="en-US" sz="1200" kern="1200" dirty="0" err="1" smtClean="0">
+                <a:solidFill>
+                  <a:schemeClr val="tx1"/>
+                </a:solidFill>
+                <a:effectLst/>
+                <a:latin typeface="+mn-lt"/>
+                <a:ea typeface="+mn-ea"/>
+                <a:cs typeface="+mn-cs"/>
+              </a:rPr>
+              <a:t>NSFileManager</a:t>
+            </a:r>
+            <a:r>
+              <a:rPr lang="en-US" sz="1200" kern="1200" dirty="0" smtClean="0">
+                <a:solidFill>
+                  <a:schemeClr val="tx1"/>
+                </a:solidFill>
+                <a:effectLst/>
+                <a:latin typeface="+mn-lt"/>
+                <a:ea typeface="+mn-ea"/>
+                <a:cs typeface="+mn-cs"/>
+              </a:rPr>
+              <a:t> class al‐ lows you to search for specific directories on the iOS </a:t>
+            </a:r>
+            <a:r>
+              <a:rPr lang="en-US" sz="1200" kern="1200" dirty="0" err="1" smtClean="0">
+                <a:solidFill>
+                  <a:schemeClr val="tx1"/>
+                </a:solidFill>
+                <a:effectLst/>
+                <a:latin typeface="+mn-lt"/>
+                <a:ea typeface="+mn-ea"/>
+                <a:cs typeface="+mn-cs"/>
+              </a:rPr>
+              <a:t>filesystem</a:t>
+            </a:r>
+            <a:r>
+              <a:rPr lang="en-US" sz="1200" kern="1200" dirty="0" smtClean="0">
+                <a:solidFill>
+                  <a:schemeClr val="tx1"/>
+                </a:solidFill>
+                <a:effectLst/>
+                <a:latin typeface="+mn-lt"/>
+                <a:ea typeface="+mn-ea"/>
+                <a:cs typeface="+mn-cs"/>
+              </a:rPr>
+              <a:t>, mostly in your app’s sandbox. There are two parameters to this method: </a:t>
+            </a:r>
+            <a:endParaRPr lang="en-US" dirty="0" smtClean="0"/>
+          </a:p>
+          <a:p>
+            <a:r>
+              <a:rPr lang="en-US" sz="1200" kern="1200" dirty="0" err="1" smtClean="0">
+                <a:solidFill>
+                  <a:schemeClr val="tx1"/>
+                </a:solidFill>
+                <a:effectLst/>
+                <a:latin typeface="+mn-lt"/>
+                <a:ea typeface="+mn-ea"/>
+                <a:cs typeface="+mn-cs"/>
+              </a:rPr>
+              <a:t>URLsForDirectory</a:t>
+            </a:r>
+            <a:r>
+              <a:rPr lang="en-US" sz="1200" kern="1200" dirty="0" smtClean="0">
+                <a:solidFill>
+                  <a:schemeClr val="tx1"/>
+                </a:solidFill>
+                <a:effectLst/>
+                <a:latin typeface="+mn-lt"/>
+                <a:ea typeface="+mn-ea"/>
+                <a:cs typeface="+mn-cs"/>
+              </a:rPr>
+              <a:t>:</a:t>
+            </a:r>
+            <a:br>
+              <a:rPr lang="en-US" sz="1200" kern="1200" dirty="0" smtClean="0">
+                <a:solidFill>
+                  <a:schemeClr val="tx1"/>
+                </a:solidFill>
+                <a:effectLst/>
+                <a:latin typeface="+mn-lt"/>
+                <a:ea typeface="+mn-ea"/>
+                <a:cs typeface="+mn-cs"/>
+              </a:rPr>
+            </a:br>
+            <a:r>
+              <a:rPr lang="en-US" sz="1200" kern="1200" dirty="0" smtClean="0">
+                <a:solidFill>
+                  <a:schemeClr val="tx1"/>
+                </a:solidFill>
+                <a:effectLst/>
+                <a:latin typeface="+mn-lt"/>
+                <a:ea typeface="+mn-ea"/>
+                <a:cs typeface="+mn-cs"/>
+              </a:rPr>
+              <a:t>This is the directory that you want to search for. Pass a value of type </a:t>
+            </a:r>
+            <a:r>
+              <a:rPr lang="en-US" sz="1200" kern="1200" dirty="0" err="1" smtClean="0">
+                <a:solidFill>
+                  <a:schemeClr val="tx1"/>
+                </a:solidFill>
+                <a:effectLst/>
+                <a:latin typeface="+mn-lt"/>
+                <a:ea typeface="+mn-ea"/>
+                <a:cs typeface="+mn-cs"/>
+              </a:rPr>
+              <a:t>NSSearchPath</a:t>
+            </a:r>
+            <a:r>
+              <a:rPr lang="en-US" sz="1200" kern="1200" dirty="0" smtClean="0">
+                <a:solidFill>
+                  <a:schemeClr val="tx1"/>
+                </a:solidFill>
+                <a:effectLst/>
+                <a:latin typeface="+mn-lt"/>
+                <a:ea typeface="+mn-ea"/>
+                <a:cs typeface="+mn-cs"/>
+              </a:rPr>
+              <a:t> Directory enumeration to this parameter. I will talk more about this soon. </a:t>
+            </a:r>
+            <a:endParaRPr lang="en-US" dirty="0" smtClean="0"/>
+          </a:p>
+          <a:p>
+            <a:r>
+              <a:rPr lang="en-US" sz="1200" kern="1200" dirty="0" err="1" smtClean="0">
+                <a:solidFill>
+                  <a:schemeClr val="tx1"/>
+                </a:solidFill>
+                <a:effectLst/>
+                <a:latin typeface="+mn-lt"/>
+                <a:ea typeface="+mn-ea"/>
+                <a:cs typeface="+mn-cs"/>
+              </a:rPr>
+              <a:t>inDomains</a:t>
+            </a:r>
+            <a:r>
+              <a:rPr lang="en-US" sz="1200" kern="1200" dirty="0" smtClean="0">
+                <a:solidFill>
+                  <a:schemeClr val="tx1"/>
+                </a:solidFill>
+                <a:effectLst/>
+                <a:latin typeface="+mn-lt"/>
+                <a:ea typeface="+mn-ea"/>
+                <a:cs typeface="+mn-cs"/>
+              </a:rPr>
+              <a:t> </a:t>
+            </a:r>
+            <a:endParaRPr lang="en-US" dirty="0" smtClean="0"/>
+          </a:p>
+          <a:p>
+            <a:r>
+              <a:rPr lang="en-US" sz="1200" kern="1200" dirty="0" smtClean="0">
+                <a:solidFill>
+                  <a:schemeClr val="tx1"/>
+                </a:solidFill>
+                <a:effectLst/>
+                <a:latin typeface="+mn-lt"/>
+                <a:ea typeface="+mn-ea"/>
+                <a:cs typeface="+mn-cs"/>
+              </a:rPr>
+              <a:t>This is </a:t>
+            </a:r>
+            <a:r>
+              <a:rPr lang="en-US" sz="1200" i="1" kern="1200" dirty="0" smtClean="0">
+                <a:solidFill>
+                  <a:schemeClr val="tx1"/>
+                </a:solidFill>
+                <a:effectLst/>
+                <a:latin typeface="+mn-lt"/>
+                <a:ea typeface="+mn-ea"/>
+                <a:cs typeface="+mn-cs"/>
+              </a:rPr>
+              <a:t>where </a:t>
+            </a:r>
+            <a:r>
+              <a:rPr lang="en-US" sz="1200" kern="1200" dirty="0" smtClean="0">
+                <a:solidFill>
+                  <a:schemeClr val="tx1"/>
+                </a:solidFill>
+                <a:effectLst/>
+                <a:latin typeface="+mn-lt"/>
+                <a:ea typeface="+mn-ea"/>
+                <a:cs typeface="+mn-cs"/>
+              </a:rPr>
+              <a:t>you look for the given directory. The value to this parameter must be of type </a:t>
+            </a:r>
+            <a:r>
+              <a:rPr lang="en-US" sz="1200" kern="1200" dirty="0" err="1" smtClean="0">
+                <a:solidFill>
+                  <a:schemeClr val="tx1"/>
+                </a:solidFill>
+                <a:effectLst/>
+                <a:latin typeface="+mn-lt"/>
+                <a:ea typeface="+mn-ea"/>
+                <a:cs typeface="+mn-cs"/>
+              </a:rPr>
+              <a:t>NSSearchPathDomainMask</a:t>
+            </a:r>
+            <a:r>
+              <a:rPr lang="en-US" sz="1200" kern="1200" dirty="0" smtClean="0">
+                <a:solidFill>
+                  <a:schemeClr val="tx1"/>
+                </a:solidFill>
+                <a:effectLst/>
+                <a:latin typeface="+mn-lt"/>
+                <a:ea typeface="+mn-ea"/>
+                <a:cs typeface="+mn-cs"/>
+              </a:rPr>
+              <a:t> enumeration. </a:t>
+            </a:r>
+            <a:endParaRPr lang="en-US" dirty="0" smtClean="0"/>
+          </a:p>
+          <a:p>
+            <a:endParaRPr lang="en-US" dirty="0"/>
+          </a:p>
+        </p:txBody>
+      </p:sp>
+      <p:sp>
+        <p:nvSpPr>
+          <p:cNvPr id="4" name="Slide Number Placeholder 3"/>
+          <p:cNvSpPr>
+            <a:spLocks noGrp="1"/>
+          </p:cNvSpPr>
+          <p:nvPr>
+            <p:ph type="sldNum" sz="quarter" idx="10"/>
+          </p:nvPr>
+        </p:nvSpPr>
+        <p:spPr/>
+        <p:txBody>
+          <a:bodyPr/>
+          <a:lstStyle/>
+          <a:p>
+            <a:fld id="{2FA28F3C-3BD5-B440-9A99-7C2195A665A9}" type="slidenum">
+              <a:rPr lang="en-US" smtClean="0"/>
+              <a:t>6</a:t>
+            </a:fld>
+            <a:endParaRPr lang="en-US"/>
+          </a:p>
+        </p:txBody>
+      </p:sp>
+    </p:spTree>
+    <p:extLst>
+      <p:ext uri="{BB962C8B-B14F-4D97-AF65-F5344CB8AC3E}">
+        <p14:creationId xmlns:p14="http://schemas.microsoft.com/office/powerpoint/2010/main" val="46154004"/>
+      </p:ext>
+    </p:extLst>
+  </p:cSld>
+  <p:clrMapOvr>
+    <a:masterClrMapping/>
+  </p:clrMapOvr>
+</p:notes>
+</file>
+
+<file path=ppt/notesSlides/notesSlide6.xml><?xml version="1.0" encoding="utf-8"?>
+<p:notes xmlns:a="http://schemas.openxmlformats.org/drawingml/2006/main" xmlns:r="http://schemas.openxmlformats.org/officeDocument/2006/relationships" xmlns:p="http://schemas.openxmlformats.org/presentationml/2006/main">
+  <p:cSld>
+    <p:spTree>
+      <p:nvGrpSpPr>
+        <p:cNvPr id="1" name=""/>
+        <p:cNvGrpSpPr/>
+        <p:nvPr/>
+      </p:nvGrpSpPr>
+      <p:grpSpPr>
+        <a:xfrm>
+          <a:off x="0" y="0"/>
+          <a:ext cx="0" cy="0"/>
+          <a:chOff x="0" y="0"/>
+          <a:chExt cx="0" cy="0"/>
+        </a:xfrm>
+      </p:grpSpPr>
+      <p:sp>
+        <p:nvSpPr>
+          <p:cNvPr id="2" name="Slide Image Placeholder 1"/>
+          <p:cNvSpPr>
+            <a:spLocks noGrp="1" noRot="1" noChangeAspect="1"/>
+          </p:cNvSpPr>
+          <p:nvPr>
+            <p:ph type="sldImg"/>
+          </p:nvPr>
+        </p:nvSpPr>
+        <p:spPr/>
+      </p:sp>
+      <p:sp>
+        <p:nvSpPr>
+          <p:cNvPr id="3" name="Notes Placeholder 2"/>
+          <p:cNvSpPr>
+            <a:spLocks noGrp="1"/>
+          </p:cNvSpPr>
+          <p:nvPr>
+            <p:ph type="body" idx="1"/>
+          </p:nvPr>
+        </p:nvSpPr>
+        <p:spPr/>
+        <p:txBody>
+          <a:bodyPr/>
+          <a:lstStyle/>
+          <a:p>
+            <a:r>
+              <a:rPr lang="en-US" sz="1200" kern="1200" dirty="0" err="1" smtClean="0">
+                <a:solidFill>
+                  <a:schemeClr val="tx1"/>
+                </a:solidFill>
+                <a:latin typeface="+mn-lt"/>
+                <a:ea typeface="+mn-ea"/>
+                <a:cs typeface="+mn-cs"/>
+              </a:rPr>
+              <a:t>NSData</a:t>
+            </a:r>
+            <a:r>
+              <a:rPr lang="en-US" sz="1200" kern="1200" dirty="0" smtClean="0">
+                <a:solidFill>
+                  <a:schemeClr val="tx1"/>
+                </a:solidFill>
+                <a:latin typeface="+mn-lt"/>
+                <a:ea typeface="+mn-ea"/>
+                <a:cs typeface="+mn-cs"/>
+              </a:rPr>
+              <a:t> and its mutable subclass </a:t>
+            </a:r>
+            <a:r>
+              <a:rPr lang="en-US" sz="1200" kern="1200" dirty="0" smtClean="0">
+                <a:solidFill>
+                  <a:schemeClr val="tx1"/>
+                </a:solidFill>
+                <a:latin typeface="+mn-lt"/>
+                <a:ea typeface="+mn-ea"/>
+                <a:cs typeface="+mn-cs"/>
+                <a:hlinkClick r:id="rId3"/>
+              </a:rPr>
+              <a:t>NSMutableData provide data objects, object-oriented wrappers for byte buffers. Data objects let simple allocated buffers (that is, data with no embedded pointers) take on the behavior of Foundation objects.</a:t>
+            </a:r>
+          </a:p>
+          <a:p>
+            <a:r>
+              <a:rPr lang="en-US" sz="1200" kern="1200" dirty="0" err="1" smtClean="0">
+                <a:solidFill>
+                  <a:schemeClr val="tx1"/>
+                </a:solidFill>
+                <a:latin typeface="+mn-lt"/>
+                <a:ea typeface="+mn-ea"/>
+                <a:cs typeface="+mn-cs"/>
+              </a:rPr>
+              <a:t>NSData</a:t>
+            </a:r>
+            <a:r>
+              <a:rPr lang="en-US" sz="1200" kern="1200" dirty="0" smtClean="0">
+                <a:solidFill>
+                  <a:schemeClr val="tx1"/>
+                </a:solidFill>
+                <a:latin typeface="+mn-lt"/>
+                <a:ea typeface="+mn-ea"/>
+                <a:cs typeface="+mn-cs"/>
+              </a:rPr>
+              <a:t> creates static data objects, and </a:t>
+            </a:r>
+            <a:r>
+              <a:rPr lang="en-US" sz="1200" kern="1200" dirty="0" err="1" smtClean="0">
+                <a:solidFill>
+                  <a:schemeClr val="tx1"/>
+                </a:solidFill>
+                <a:latin typeface="+mn-lt"/>
+                <a:ea typeface="+mn-ea"/>
+                <a:cs typeface="+mn-cs"/>
+              </a:rPr>
+              <a:t>NSMutableData</a:t>
+            </a:r>
+            <a:r>
+              <a:rPr lang="en-US" sz="1200" kern="1200" dirty="0" smtClean="0">
+                <a:solidFill>
+                  <a:schemeClr val="tx1"/>
+                </a:solidFill>
+                <a:latin typeface="+mn-lt"/>
+                <a:ea typeface="+mn-ea"/>
+                <a:cs typeface="+mn-cs"/>
+              </a:rPr>
+              <a:t> creates dynamic data objects. </a:t>
+            </a:r>
+            <a:r>
+              <a:rPr lang="en-US" sz="1200" kern="1200" dirty="0" err="1" smtClean="0">
+                <a:solidFill>
+                  <a:schemeClr val="tx1"/>
+                </a:solidFill>
+                <a:latin typeface="+mn-lt"/>
+                <a:ea typeface="+mn-ea"/>
+                <a:cs typeface="+mn-cs"/>
+              </a:rPr>
+              <a:t>NSData</a:t>
+            </a:r>
+            <a:r>
+              <a:rPr lang="en-US" sz="1200" kern="1200" dirty="0" smtClean="0">
+                <a:solidFill>
+                  <a:schemeClr val="tx1"/>
+                </a:solidFill>
+                <a:latin typeface="+mn-lt"/>
+                <a:ea typeface="+mn-ea"/>
+                <a:cs typeface="+mn-cs"/>
+              </a:rPr>
+              <a:t> and </a:t>
+            </a:r>
+            <a:r>
+              <a:rPr lang="en-US" sz="1200" kern="1200" dirty="0" err="1" smtClean="0">
+                <a:solidFill>
+                  <a:schemeClr val="tx1"/>
+                </a:solidFill>
+                <a:latin typeface="+mn-lt"/>
+                <a:ea typeface="+mn-ea"/>
+                <a:cs typeface="+mn-cs"/>
+              </a:rPr>
+              <a:t>NSMutableData</a:t>
+            </a:r>
+            <a:r>
+              <a:rPr lang="en-US" sz="1200" kern="1200" dirty="0" smtClean="0">
+                <a:solidFill>
+                  <a:schemeClr val="tx1"/>
+                </a:solidFill>
+                <a:latin typeface="+mn-lt"/>
+                <a:ea typeface="+mn-ea"/>
+                <a:cs typeface="+mn-cs"/>
+              </a:rPr>
+              <a:t> are typically used for data storage and are also useful in Distributed Objects applications, where data contained in data objects can be copied or moved between applications.</a:t>
+            </a:r>
+          </a:p>
+          <a:p>
+            <a:r>
+              <a:rPr lang="en-US" dirty="0" smtClean="0"/>
+              <a:t>+ data binary: of String</a:t>
+            </a:r>
+            <a:r>
+              <a:rPr lang="en-US" baseline="0" dirty="0" smtClean="0"/>
+              <a:t>, image, file</a:t>
+            </a:r>
+            <a:r>
+              <a:rPr lang="is-IS" baseline="0" smtClean="0"/>
+              <a:t>….</a:t>
+            </a:r>
+            <a:endParaRPr lang="en-US" dirty="0"/>
+          </a:p>
+        </p:txBody>
+      </p:sp>
+      <p:sp>
+        <p:nvSpPr>
+          <p:cNvPr id="4" name="Slide Number Placeholder 3"/>
+          <p:cNvSpPr>
+            <a:spLocks noGrp="1"/>
+          </p:cNvSpPr>
+          <p:nvPr>
+            <p:ph type="sldNum" sz="quarter" idx="10"/>
+          </p:nvPr>
+        </p:nvSpPr>
+        <p:spPr/>
+        <p:txBody>
+          <a:bodyPr/>
+          <a:lstStyle/>
+          <a:p>
+            <a:fld id="{2FA28F3C-3BD5-B440-9A99-7C2195A665A9}" type="slidenum">
+              <a:rPr lang="en-US" smtClean="0"/>
+              <a:t>7</a:t>
+            </a:fld>
+            <a:endParaRPr lang="en-US"/>
+          </a:p>
+        </p:txBody>
+      </p:sp>
+    </p:spTree>
+    <p:extLst>
+      <p:ext uri="{BB962C8B-B14F-4D97-AF65-F5344CB8AC3E}">
+        <p14:creationId xmlns:p14="http://schemas.microsoft.com/office/powerpoint/2010/main" val="1486212028"/>
       </p:ext>
     </p:extLst>
   </p:cSld>
@@ -1978,7 +2556,7 @@
           <a:p>
             <a:fld id="{4C6B5BA2-20C7-FC44-AF26-F0779D5139B7}" type="datetimeFigureOut">
               <a:rPr lang="en-US" smtClean="0"/>
-              <a:t>10/5/15</a:t>
+              <a:t>10/28/15</a:t>
             </a:fld>
             <a:endParaRPr lang="en-US"/>
           </a:p>
@@ -2162,7 +2740,7 @@
           <a:p>
             <a:fld id="{4C6B5BA2-20C7-FC44-AF26-F0779D5139B7}" type="datetimeFigureOut">
               <a:rPr lang="en-US" smtClean="0"/>
-              <a:t>10/5/15</a:t>
+              <a:t>10/28/15</a:t>
             </a:fld>
             <a:endParaRPr lang="en-US"/>
           </a:p>
@@ -2342,7 +2920,7 @@
           <a:p>
             <a:fld id="{4C6B5BA2-20C7-FC44-AF26-F0779D5139B7}" type="datetimeFigureOut">
               <a:rPr lang="en-US" smtClean="0"/>
-              <a:t>10/5/15</a:t>
+              <a:t>10/28/15</a:t>
             </a:fld>
             <a:endParaRPr lang="en-US"/>
           </a:p>
@@ -2517,7 +3095,7 @@
           <a:p>
             <a:fld id="{4C6B5BA2-20C7-FC44-AF26-F0779D5139B7}" type="datetimeFigureOut">
               <a:rPr lang="en-US" smtClean="0"/>
-              <a:t>10/5/15</a:t>
+              <a:t>10/28/15</a:t>
             </a:fld>
             <a:endParaRPr lang="en-US"/>
           </a:p>
@@ -2838,7 +3416,7 @@
           <a:p>
             <a:fld id="{4C6B5BA2-20C7-FC44-AF26-F0779D5139B7}" type="datetimeFigureOut">
               <a:rPr lang="en-US" smtClean="0"/>
-              <a:t>10/5/15</a:t>
+              <a:t>10/28/15</a:t>
             </a:fld>
             <a:endParaRPr lang="en-US"/>
           </a:p>
@@ -3303,7 +3881,7 @@
           <a:p>
             <a:fld id="{4C6B5BA2-20C7-FC44-AF26-F0779D5139B7}" type="datetimeFigureOut">
               <a:rPr lang="en-US" smtClean="0"/>
-              <a:t>10/5/15</a:t>
+              <a:t>10/28/15</a:t>
             </a:fld>
             <a:endParaRPr lang="en-US"/>
           </a:p>
@@ -3719,7 +4297,7 @@
           <a:p>
             <a:fld id="{4C6B5BA2-20C7-FC44-AF26-F0779D5139B7}" type="datetimeFigureOut">
               <a:rPr lang="en-US" smtClean="0"/>
-              <a:t>10/5/15</a:t>
+              <a:t>10/28/15</a:t>
             </a:fld>
             <a:endParaRPr lang="en-US"/>
           </a:p>
@@ -3842,7 +4420,7 @@
           <a:p>
             <a:fld id="{4C6B5BA2-20C7-FC44-AF26-F0779D5139B7}" type="datetimeFigureOut">
               <a:rPr lang="en-US" smtClean="0"/>
-              <a:t>10/5/15</a:t>
+              <a:t>10/28/15</a:t>
             </a:fld>
             <a:endParaRPr lang="en-US"/>
           </a:p>
@@ -3960,7 +4538,7 @@
           <a:p>
             <a:fld id="{4C6B5BA2-20C7-FC44-AF26-F0779D5139B7}" type="datetimeFigureOut">
               <a:rPr lang="en-US" smtClean="0"/>
-              <a:t>10/5/15</a:t>
+              <a:t>10/28/15</a:t>
             </a:fld>
             <a:endParaRPr lang="en-US"/>
           </a:p>
@@ -4318,7 +4896,7 @@
           <a:p>
             <a:fld id="{4C6B5BA2-20C7-FC44-AF26-F0779D5139B7}" type="datetimeFigureOut">
               <a:rPr lang="en-US" smtClean="0"/>
-              <a:t>10/5/15</a:t>
+              <a:t>10/28/15</a:t>
             </a:fld>
             <a:endParaRPr lang="en-US"/>
           </a:p>
@@ -4830,7 +5408,7 @@
           <a:p>
             <a:fld id="{4C6B5BA2-20C7-FC44-AF26-F0779D5139B7}" type="datetimeFigureOut">
               <a:rPr lang="en-US" smtClean="0"/>
-              <a:t>10/5/15</a:t>
+              <a:t>10/28/15</a:t>
             </a:fld>
             <a:endParaRPr lang="en-US"/>
           </a:p>
@@ -5185,7 +5763,7 @@
           <a:p>
             <a:fld id="{4C6B5BA2-20C7-FC44-AF26-F0779D5139B7}" type="datetimeFigureOut">
               <a:rPr lang="en-US" smtClean="0"/>
-              <a:t>10/5/15</a:t>
+              <a:t>10/28/15</a:t>
             </a:fld>
             <a:endParaRPr lang="en-US"/>
           </a:p>
@@ -5857,11 +6435,7 @@
           <a:p>
             <a:r>
               <a:rPr lang="en-US" dirty="0" smtClean="0"/>
-              <a:t>Swift Day </a:t>
-            </a:r>
-            <a:r>
-              <a:rPr lang="en-US" dirty="0" smtClean="0"/>
-              <a:t>12</a:t>
+              <a:t>Swift Day 12</a:t>
             </a:r>
             <a:endParaRPr lang="en-US" dirty="0"/>
           </a:p>
@@ -6012,7 +6586,22 @@
             </a:r>
             <a:r>
               <a:rPr lang="en-US" dirty="0"/>
-              <a:t>, Saving Image</a:t>
+              <a:t>, </a:t>
+            </a:r>
+            <a:r>
+              <a:rPr lang="en-US" dirty="0" smtClean="0"/>
+              <a:t/>
+            </a:r>
+            <a:br>
+              <a:rPr lang="en-US" dirty="0" smtClean="0"/>
+            </a:br>
+            <a:r>
+              <a:rPr lang="en-US" dirty="0" smtClean="0"/>
+              <a:t>Saving </a:t>
+            </a:r>
+            <a:r>
+              <a:rPr lang="en-US" dirty="0"/>
+              <a:t>Image</a:t>
             </a:r>
             <a:endParaRPr lang="en-US" sz="4800" dirty="0"/>
           </a:p>
@@ -6590,7 +7179,37 @@
               <a:t> </a:t>
             </a:r>
             <a:r>
-              <a:rPr lang="en-US" dirty="0" err="1">
+              <a:rPr lang="en-US" dirty="0" smtClean="0">
+                <a:solidFill>
+                  <a:schemeClr val="tx1"/>
+                </a:solidFill>
+              </a:rPr>
+              <a:t/>
+            </a:r>
+            <a:br>
+              <a:rPr lang="en-US" dirty="0" smtClean="0">
+                <a:solidFill>
+                  <a:schemeClr val="tx1"/>
+                </a:solidFill>
+              </a:rPr>
+            </a:br>
+            <a:r>
+              <a:rPr lang="en-US" dirty="0">
+                <a:solidFill>
+                  <a:schemeClr val="tx1"/>
+                </a:solidFill>
+              </a:rPr>
+              <a:t/>
+            </a:r>
+            <a:br>
+              <a:rPr lang="en-US" dirty="0">
+                <a:solidFill>
+                  <a:schemeClr val="tx1"/>
+                </a:solidFill>
+              </a:rPr>
+            </a:br>
+            <a:r>
+              <a:rPr lang="en-US" dirty="0" err="1" smtClean="0">
                 <a:solidFill>
                   <a:schemeClr val="tx1"/>
                 </a:solidFill>
@@ -6598,15 +7217,7 @@
               <a:t>NSFileManager</a:t>
             </a:r>
             <a:r>
-              <a:rPr lang="en-US" b="0" dirty="0">
-                <a:solidFill>
-                  <a:schemeClr val="tx1"/>
-                </a:solidFill>
-              </a:rPr>
-              <a:t> </a:t>
-            </a:r>
-            <a:r>
-              <a:rPr lang="en-US" b="0" dirty="0" smtClean="0">
+              <a:rPr lang="en-US" dirty="0" smtClean="0">
                 <a:solidFill>
                   <a:schemeClr val="tx1"/>
                 </a:solidFill>
@@ -6614,18 +7225,120 @@
               <a:t/>
             </a:r>
             <a:br>
-              <a:rPr lang="en-US" b="0" dirty="0" smtClean="0">
+              <a:rPr lang="en-US" dirty="0" smtClean="0">
                 <a:solidFill>
                   <a:schemeClr val="tx1"/>
                 </a:solidFill>
               </a:rPr>
             </a:br>
             <a:r>
+              <a:rPr lang="en-US" dirty="0" smtClean="0">
+                <a:solidFill>
+                  <a:schemeClr val="tx1"/>
+                </a:solidFill>
+              </a:rPr>
+              <a:t/>
+            </a:r>
+            <a:br>
+              <a:rPr lang="en-US" dirty="0" smtClean="0">
+                <a:solidFill>
+                  <a:schemeClr val="tx1"/>
+                </a:solidFill>
+              </a:rPr>
+            </a:br>
+            <a:r>
               <a:rPr lang="en-US" dirty="0"/>
+              <a:t>+</a:t>
+            </a:r>
+            <a:r>
+              <a:rPr lang="en-US" sz="3200" dirty="0" err="1" smtClean="0"/>
+              <a:t>defaultManager</a:t>
+            </a:r>
+            <a:r>
+              <a:rPr lang="en-US" sz="3200" dirty="0"/>
+              <a:t>()</a:t>
+            </a:r>
+            <a:r>
+              <a:rPr lang="en-US" sz="3200" b="0" dirty="0" smtClean="0">
+                <a:solidFill>
+                  <a:schemeClr val="tx1"/>
+                </a:solidFill>
+              </a:rPr>
+              <a:t>  -&gt; singleton instance</a:t>
+            </a:r>
+            <a:br>
+              <a:rPr lang="en-US" sz="3200" b="0" dirty="0" smtClean="0">
+                <a:solidFill>
+                  <a:schemeClr val="tx1"/>
+                </a:solidFill>
+              </a:rPr>
+            </a:br>
+            <a:r>
+              <a:rPr lang="en-US" sz="3200" b="0" dirty="0" smtClean="0">
+                <a:solidFill>
+                  <a:schemeClr val="tx1"/>
+                </a:solidFill>
+              </a:rPr>
               <a:t/>
             </a:r>
             <a:br>
-              <a:rPr lang="en-US" dirty="0"/>
+              <a:rPr lang="en-US" sz="3200" b="0" dirty="0" smtClean="0">
+                <a:solidFill>
+                  <a:schemeClr val="tx1"/>
+                </a:solidFill>
+              </a:rPr>
+            </a:br>
+            <a:r>
+              <a:rPr lang="en-US" sz="3200" b="0" dirty="0" smtClean="0">
+                <a:solidFill>
+                  <a:schemeClr val="tx1"/>
+                </a:solidFill>
+              </a:rPr>
+              <a:t/>
+            </a:r>
+            <a:br>
+              <a:rPr lang="en-US" sz="3200" b="0" dirty="0" smtClean="0">
+                <a:solidFill>
+                  <a:schemeClr val="tx1"/>
+                </a:solidFill>
+              </a:rPr>
+            </a:br>
+            <a:r>
+              <a:rPr lang="en-US" sz="3200" b="0" dirty="0" smtClean="0">
+                <a:solidFill>
+                  <a:schemeClr val="tx1"/>
+                </a:solidFill>
+              </a:rPr>
+              <a:t/>
+            </a:r>
+            <a:br>
+              <a:rPr lang="en-US" sz="3200" b="0" dirty="0" smtClean="0">
+                <a:solidFill>
+                  <a:schemeClr val="tx1"/>
+                </a:solidFill>
+              </a:rPr>
+            </a:br>
+            <a:r>
+              <a:rPr lang="en-US" sz="3200" b="0" dirty="0" smtClean="0">
+                <a:solidFill>
+                  <a:schemeClr val="tx1"/>
+                </a:solidFill>
+              </a:rPr>
+              <a:t/>
+            </a:r>
+            <a:br>
+              <a:rPr lang="en-US" sz="3200" b="0" dirty="0" smtClean="0">
+                <a:solidFill>
+                  <a:schemeClr val="tx1"/>
+                </a:solidFill>
+              </a:rPr>
+            </a:br>
+            <a:r>
+              <a:rPr lang="en-US" sz="3200" dirty="0"/>
+              <a:t/>
+            </a:r>
+            <a:br>
+              <a:rPr lang="en-US" sz="3200" dirty="0"/>
             </a:br>
             <a:r>
               <a:rPr lang="en-US" dirty="0" smtClean="0">
@@ -6650,6 +7363,346 @@
     <p:extLst>
       <p:ext uri="{BB962C8B-B14F-4D97-AF65-F5344CB8AC3E}">
         <p14:creationId xmlns:p14="http://schemas.microsoft.com/office/powerpoint/2010/main" val="1303625071"/>
+      </p:ext>
+    </p:extLst>
+  </p:cSld>
+  <p:clrMapOvr>
+    <a:masterClrMapping/>
+  </p:clrMapOvr>
+  <p:timing>
+    <p:tnLst>
+      <p:par>
+        <p:cTn id="1" dur="indefinite" restart="never" nodeType="tmRoot"/>
+      </p:par>
+    </p:tnLst>
+  </p:timing>
+</p:sld>
+</file>
+
+<file path=ppt/slides/slide6.xml><?xml version="1.0" encoding="utf-8"?>
+<p:sld xmlns:a="http://schemas.openxmlformats.org/drawingml/2006/main" xmlns:r="http://schemas.openxmlformats.org/officeDocument/2006/relationships" xmlns:p="http://schemas.openxmlformats.org/presentationml/2006/main">
+  <p:cSld>
+    <p:bg>
+      <p:bgPr>
+        <a:solidFill>
+          <a:schemeClr val="bg1">
+            <a:lumMod val="85000"/>
+            <a:alpha val="50000"/>
+          </a:schemeClr>
+        </a:solidFill>
+        <a:effectLst/>
+      </p:bgPr>
+    </p:bg>
+    <p:spTree>
+      <p:nvGrpSpPr>
+        <p:cNvPr id="1" name=""/>
+        <p:cNvGrpSpPr/>
+        <p:nvPr/>
+      </p:nvGrpSpPr>
+      <p:grpSpPr>
+        <a:xfrm>
+          <a:off x="0" y="0"/>
+          <a:ext cx="0" cy="0"/>
+          <a:chOff x="0" y="0"/>
+          <a:chExt cx="0" cy="0"/>
+        </a:xfrm>
+      </p:grpSpPr>
+      <p:sp>
+        <p:nvSpPr>
+          <p:cNvPr id="2" name="Title 1"/>
+          <p:cNvSpPr>
+            <a:spLocks noGrp="1"/>
+          </p:cNvSpPr>
+          <p:nvPr>
+            <p:ph type="title"/>
+          </p:nvPr>
+        </p:nvSpPr>
+        <p:spPr>
+          <a:xfrm>
+            <a:off x="1069848" y="457200"/>
+            <a:ext cx="10058400" cy="914400"/>
+          </a:xfrm>
+        </p:spPr>
+        <p:txBody>
+          <a:bodyPr>
+            <a:noAutofit/>
+          </a:bodyPr>
+          <a:lstStyle/>
+          <a:p>
+            <a:r>
+              <a:rPr lang="en-US" dirty="0" smtClean="0"/>
+              <a:t/>
+            </a:r>
+            <a:br>
+              <a:rPr lang="en-US" dirty="0" smtClean="0"/>
+            </a:br>
+            <a:r>
+              <a:rPr lang="en-US" dirty="0"/>
+              <a:t/>
+            </a:r>
+            <a:br>
+              <a:rPr lang="en-US" dirty="0"/>
+            </a:br>
+            <a:r>
+              <a:rPr lang="en-US" dirty="0" smtClean="0"/>
+              <a:t/>
+            </a:r>
+            <a:br>
+              <a:rPr lang="en-US" dirty="0" smtClean="0"/>
+            </a:br>
+            <a:r>
+              <a:rPr lang="en-US" dirty="0"/>
+              <a:t/>
+            </a:r>
+            <a:br>
+              <a:rPr lang="en-US" dirty="0"/>
+            </a:br>
+            <a:r>
+              <a:rPr lang="en-US" dirty="0">
+                <a:solidFill>
+                  <a:schemeClr val="tx1"/>
+                </a:solidFill>
+              </a:rPr>
+              <a:t> </a:t>
+            </a:r>
+            <a:r>
+              <a:rPr lang="en-US" dirty="0" err="1" smtClean="0">
+                <a:solidFill>
+                  <a:schemeClr val="tx1"/>
+                </a:solidFill>
+              </a:rPr>
+              <a:t>NSFileHandle</a:t>
+            </a:r>
+            <a:r>
+              <a:rPr lang="en-US" b="0" dirty="0" smtClean="0">
+                <a:solidFill>
+                  <a:schemeClr val="tx1"/>
+                </a:solidFill>
+              </a:rPr>
+              <a:t> </a:t>
+            </a:r>
+            <a:br>
+              <a:rPr lang="en-US" b="0" dirty="0" smtClean="0">
+                <a:solidFill>
+                  <a:schemeClr val="tx1"/>
+                </a:solidFill>
+              </a:rPr>
+            </a:br>
+            <a:r>
+              <a:rPr lang="en-US" b="0" dirty="0" smtClean="0">
+                <a:solidFill>
+                  <a:schemeClr val="tx1"/>
+                </a:solidFill>
+              </a:rPr>
+              <a:t/>
+            </a:r>
+            <a:br>
+              <a:rPr lang="en-US" b="0" dirty="0" smtClean="0">
+                <a:solidFill>
+                  <a:schemeClr val="tx1"/>
+                </a:solidFill>
+              </a:rPr>
+            </a:br>
+            <a:r>
+              <a:rPr lang="en-US" dirty="0"/>
+              <a:t/>
+            </a:r>
+            <a:br>
+              <a:rPr lang="en-US" dirty="0"/>
+            </a:br>
+            <a:r>
+              <a:rPr lang="en-US" dirty="0" smtClean="0">
+                <a:solidFill>
+                  <a:schemeClr val="tx1"/>
+                </a:solidFill>
+              </a:rPr>
+              <a:t> </a:t>
+            </a:r>
+            <a:r>
+              <a:rPr lang="en-US" dirty="0"/>
+              <a:t/>
+            </a:r>
+            <a:br>
+              <a:rPr lang="en-US" dirty="0"/>
+            </a:br>
+            <a:endParaRPr lang="en-US" sz="4800" dirty="0"/>
+          </a:p>
+        </p:txBody>
+      </p:sp>
+    </p:spTree>
+    <p:extLst>
+      <p:ext uri="{BB962C8B-B14F-4D97-AF65-F5344CB8AC3E}">
+        <p14:creationId xmlns:p14="http://schemas.microsoft.com/office/powerpoint/2010/main" val="434559293"/>
+      </p:ext>
+    </p:extLst>
+  </p:cSld>
+  <p:clrMapOvr>
+    <a:masterClrMapping/>
+  </p:clrMapOvr>
+  <p:timing>
+    <p:tnLst>
+      <p:par>
+        <p:cTn id="1" dur="indefinite" restart="never" nodeType="tmRoot"/>
+      </p:par>
+    </p:tnLst>
+  </p:timing>
+</p:sld>
+</file>
+
+<file path=ppt/slides/slide7.xml><?xml version="1.0" encoding="utf-8"?>
+<p:sld xmlns:a="http://schemas.openxmlformats.org/drawingml/2006/main" xmlns:r="http://schemas.openxmlformats.org/officeDocument/2006/relationships" xmlns:p="http://schemas.openxmlformats.org/presentationml/2006/main">
+  <p:cSld>
+    <p:bg>
+      <p:bgPr>
+        <a:solidFill>
+          <a:schemeClr val="bg1">
+            <a:lumMod val="85000"/>
+            <a:alpha val="50000"/>
+          </a:schemeClr>
+        </a:solidFill>
+        <a:effectLst/>
+      </p:bgPr>
+    </p:bg>
+    <p:spTree>
+      <p:nvGrpSpPr>
+        <p:cNvPr id="1" name=""/>
+        <p:cNvGrpSpPr/>
+        <p:nvPr/>
+      </p:nvGrpSpPr>
+      <p:grpSpPr>
+        <a:xfrm>
+          <a:off x="0" y="0"/>
+          <a:ext cx="0" cy="0"/>
+          <a:chOff x="0" y="0"/>
+          <a:chExt cx="0" cy="0"/>
+        </a:xfrm>
+      </p:grpSpPr>
+      <p:sp>
+        <p:nvSpPr>
+          <p:cNvPr id="2" name="Title 1"/>
+          <p:cNvSpPr>
+            <a:spLocks noGrp="1"/>
+          </p:cNvSpPr>
+          <p:nvPr>
+            <p:ph type="title"/>
+          </p:nvPr>
+        </p:nvSpPr>
+        <p:spPr>
+          <a:xfrm>
+            <a:off x="1069848" y="457200"/>
+            <a:ext cx="10058400" cy="914400"/>
+          </a:xfrm>
+        </p:spPr>
+        <p:txBody>
+          <a:bodyPr>
+            <a:noAutofit/>
+          </a:bodyPr>
+          <a:lstStyle/>
+          <a:p>
+            <a:r>
+              <a:rPr lang="en-US" dirty="0" smtClean="0"/>
+              <a:t/>
+            </a:r>
+            <a:br>
+              <a:rPr lang="en-US" dirty="0" smtClean="0"/>
+            </a:br>
+            <a:r>
+              <a:rPr lang="en-US" dirty="0"/>
+              <a:t/>
+            </a:r>
+            <a:br>
+              <a:rPr lang="en-US" dirty="0"/>
+            </a:br>
+            <a:r>
+              <a:rPr lang="en-US" dirty="0" smtClean="0"/>
+              <a:t/>
+            </a:r>
+            <a:br>
+              <a:rPr lang="en-US" dirty="0" smtClean="0"/>
+            </a:br>
+            <a:r>
+              <a:rPr lang="en-US" dirty="0"/>
+              <a:t/>
+            </a:r>
+            <a:br>
+              <a:rPr lang="en-US" dirty="0"/>
+            </a:br>
+            <a:r>
+              <a:rPr lang="en-US" dirty="0">
+                <a:solidFill>
+                  <a:schemeClr val="tx1"/>
+                </a:solidFill>
+              </a:rPr>
+              <a:t> </a:t>
+            </a:r>
+            <a:r>
+              <a:rPr lang="en-US" dirty="0" err="1" smtClean="0">
+                <a:solidFill>
+                  <a:schemeClr val="tx1"/>
+                </a:solidFill>
+              </a:rPr>
+              <a:t>NSData</a:t>
+            </a:r>
+            <a:r>
+              <a:rPr lang="en-US" b="0" dirty="0" smtClean="0">
+                <a:solidFill>
+                  <a:schemeClr val="tx1"/>
+                </a:solidFill>
+              </a:rPr>
+              <a:t> </a:t>
+            </a:r>
+            <a:br>
+              <a:rPr lang="en-US" b="0" dirty="0" smtClean="0">
+                <a:solidFill>
+                  <a:schemeClr val="tx1"/>
+                </a:solidFill>
+              </a:rPr>
+            </a:br>
+            <a:r>
+              <a:rPr lang="en-US" b="0" dirty="0" smtClean="0">
+                <a:solidFill>
+                  <a:schemeClr val="tx1"/>
+                </a:solidFill>
+              </a:rPr>
+              <a:t/>
+            </a:r>
+            <a:br>
+              <a:rPr lang="en-US" b="0" dirty="0" smtClean="0">
+                <a:solidFill>
+                  <a:schemeClr val="tx1"/>
+                </a:solidFill>
+              </a:rPr>
+            </a:br>
+            <a:r>
+              <a:rPr lang="en-US" dirty="0"/>
+              <a:t/>
+            </a:r>
+            <a:br>
+              <a:rPr lang="en-US" dirty="0"/>
+            </a:br>
+            <a:r>
+              <a:rPr lang="en-US" dirty="0" smtClean="0">
+                <a:solidFill>
+                  <a:schemeClr val="tx1"/>
+                </a:solidFill>
+              </a:rPr>
+              <a:t> </a:t>
+            </a:r>
+            <a:r>
+              <a:rPr lang="en-US" dirty="0"/>
+              <a:t/>
+            </a:r>
+            <a:br>
+              <a:rPr lang="en-US" dirty="0"/>
+            </a:br>
+            <a:endParaRPr lang="en-US" sz="4800" dirty="0"/>
+          </a:p>
+        </p:txBody>
+      </p:sp>
+    </p:spTree>
+    <p:extLst>
+      <p:ext uri="{BB962C8B-B14F-4D97-AF65-F5344CB8AC3E}">
+        <p14:creationId xmlns:p14="http://schemas.microsoft.com/office/powerpoint/2010/main" val="596661353"/>
       </p:ext>
     </p:extLst>
   </p:cSld>

</xml_diff>